<commit_message>
Added splatting to main function for pipepline passthough and many pester tests
</commit_message>
<xml_diff>
--- a/Design Goals pptx/Write-Log design goals.pptx
+++ b/Design Goals pptx/Write-Log design goals.pptx
@@ -104,7 +104,16 @@
       </a:defRPr>
     </a:lvl9pPr>
   </p:defaultTextStyle>
+  <p:extLst>
+    <p:ext uri="{EFAFB233-063F-42B5-8137-9DF3F51BA10A}">
+      <p15:sldGuideLst xmlns:p15="http://schemas.microsoft.com/office/powerpoint/2012/main"/>
+    </p:ext>
+  </p:extLst>
 </p:presentation>
+</file>
+
+<file path=ppt/revisionInfo.xml><?xml version="1.0" encoding="utf-8"?>
+<p1510:revInfo xmlns:a="http://schemas.openxmlformats.org/drawingml/2006/main" xmlns:r="http://schemas.openxmlformats.org/officeDocument/2006/relationships" xmlns:p1510="http://schemas.microsoft.com/office/powerpoint/2015/10/main"/>
 </file>
 
 <file path=ppt/slideLayouts/slideLayout1.xml><?xml version="1.0" encoding="utf-8"?>
@@ -293,7 +302,7 @@
           <a:p>
             <a:fld id="{0E2971E3-340D-4824-B827-22EA8E515B0F}" type="datetimeFigureOut">
               <a:rPr lang="en-GB" smtClean="0"/>
-              <a:t>01/02/2018</a:t>
+              <a:t>02/02/2018</a:t>
             </a:fld>
             <a:endParaRPr lang="en-GB"/>
           </a:p>
@@ -568,7 +577,7 @@
           <a:p>
             <a:fld id="{0E2971E3-340D-4824-B827-22EA8E515B0F}" type="datetimeFigureOut">
               <a:rPr lang="en-GB" smtClean="0"/>
-              <a:t>01/02/2018</a:t>
+              <a:t>02/02/2018</a:t>
             </a:fld>
             <a:endParaRPr lang="en-GB"/>
           </a:p>
@@ -762,7 +771,7 @@
           <a:p>
             <a:fld id="{0E2971E3-340D-4824-B827-22EA8E515B0F}" type="datetimeFigureOut">
               <a:rPr lang="en-GB" smtClean="0"/>
-              <a:t>01/02/2018</a:t>
+              <a:t>02/02/2018</a:t>
             </a:fld>
             <a:endParaRPr lang="en-GB"/>
           </a:p>
@@ -1035,7 +1044,7 @@
           <a:p>
             <a:fld id="{0E2971E3-340D-4824-B827-22EA8E515B0F}" type="datetimeFigureOut">
               <a:rPr lang="en-GB" smtClean="0"/>
-              <a:t>01/02/2018</a:t>
+              <a:t>02/02/2018</a:t>
             </a:fld>
             <a:endParaRPr lang="en-GB"/>
           </a:p>
@@ -1376,7 +1385,7 @@
           <a:p>
             <a:fld id="{0E2971E3-340D-4824-B827-22EA8E515B0F}" type="datetimeFigureOut">
               <a:rPr lang="en-GB" smtClean="0"/>
-              <a:t>01/02/2018</a:t>
+              <a:t>02/02/2018</a:t>
             </a:fld>
             <a:endParaRPr lang="en-GB"/>
           </a:p>
@@ -1999,7 +2008,7 @@
           <a:p>
             <a:fld id="{0E2971E3-340D-4824-B827-22EA8E515B0F}" type="datetimeFigureOut">
               <a:rPr lang="en-GB" smtClean="0"/>
-              <a:t>01/02/2018</a:t>
+              <a:t>02/02/2018</a:t>
             </a:fld>
             <a:endParaRPr lang="en-GB"/>
           </a:p>
@@ -2859,7 +2868,7 @@
           <a:p>
             <a:fld id="{0E2971E3-340D-4824-B827-22EA8E515B0F}" type="datetimeFigureOut">
               <a:rPr lang="en-GB" smtClean="0"/>
-              <a:t>01/02/2018</a:t>
+              <a:t>02/02/2018</a:t>
             </a:fld>
             <a:endParaRPr lang="en-GB"/>
           </a:p>
@@ -3029,7 +3038,7 @@
           <a:p>
             <a:fld id="{0E2971E3-340D-4824-B827-22EA8E515B0F}" type="datetimeFigureOut">
               <a:rPr lang="en-GB" smtClean="0"/>
-              <a:t>01/02/2018</a:t>
+              <a:t>02/02/2018</a:t>
             </a:fld>
             <a:endParaRPr lang="en-GB"/>
           </a:p>
@@ -3209,7 +3218,7 @@
           <a:p>
             <a:fld id="{0E2971E3-340D-4824-B827-22EA8E515B0F}" type="datetimeFigureOut">
               <a:rPr lang="en-GB" smtClean="0"/>
-              <a:t>01/02/2018</a:t>
+              <a:t>02/02/2018</a:t>
             </a:fld>
             <a:endParaRPr lang="en-GB"/>
           </a:p>
@@ -3379,7 +3388,7 @@
           <a:p>
             <a:fld id="{0E2971E3-340D-4824-B827-22EA8E515B0F}" type="datetimeFigureOut">
               <a:rPr lang="en-GB" smtClean="0"/>
-              <a:t>01/02/2018</a:t>
+              <a:t>02/02/2018</a:t>
             </a:fld>
             <a:endParaRPr lang="en-GB"/>
           </a:p>
@@ -3626,7 +3635,7 @@
           <a:p>
             <a:fld id="{0E2971E3-340D-4824-B827-22EA8E515B0F}" type="datetimeFigureOut">
               <a:rPr lang="en-GB" smtClean="0"/>
-              <a:t>01/02/2018</a:t>
+              <a:t>02/02/2018</a:t>
             </a:fld>
             <a:endParaRPr lang="en-GB"/>
           </a:p>
@@ -3918,7 +3927,7 @@
           <a:p>
             <a:fld id="{0E2971E3-340D-4824-B827-22EA8E515B0F}" type="datetimeFigureOut">
               <a:rPr lang="en-GB" smtClean="0"/>
-              <a:t>01/02/2018</a:t>
+              <a:t>02/02/2018</a:t>
             </a:fld>
             <a:endParaRPr lang="en-GB"/>
           </a:p>
@@ -4362,7 +4371,7 @@
           <a:p>
             <a:fld id="{0E2971E3-340D-4824-B827-22EA8E515B0F}" type="datetimeFigureOut">
               <a:rPr lang="en-GB" smtClean="0"/>
-              <a:t>01/02/2018</a:t>
+              <a:t>02/02/2018</a:t>
             </a:fld>
             <a:endParaRPr lang="en-GB"/>
           </a:p>
@@ -4480,7 +4489,7 @@
           <a:p>
             <a:fld id="{0E2971E3-340D-4824-B827-22EA8E515B0F}" type="datetimeFigureOut">
               <a:rPr lang="en-GB" smtClean="0"/>
-              <a:t>01/02/2018</a:t>
+              <a:t>02/02/2018</a:t>
             </a:fld>
             <a:endParaRPr lang="en-GB"/>
           </a:p>
@@ -4575,7 +4584,7 @@
           <a:p>
             <a:fld id="{0E2971E3-340D-4824-B827-22EA8E515B0F}" type="datetimeFigureOut">
               <a:rPr lang="en-GB" smtClean="0"/>
-              <a:t>01/02/2018</a:t>
+              <a:t>02/02/2018</a:t>
             </a:fld>
             <a:endParaRPr lang="en-GB"/>
           </a:p>
@@ -4854,7 +4863,7 @@
           <a:p>
             <a:fld id="{0E2971E3-340D-4824-B827-22EA8E515B0F}" type="datetimeFigureOut">
               <a:rPr lang="en-GB" smtClean="0"/>
-              <a:t>01/02/2018</a:t>
+              <a:t>02/02/2018</a:t>
             </a:fld>
             <a:endParaRPr lang="en-GB"/>
           </a:p>
@@ -5129,7 +5138,7 @@
           <a:p>
             <a:fld id="{0E2971E3-340D-4824-B827-22EA8E515B0F}" type="datetimeFigureOut">
               <a:rPr lang="en-GB" smtClean="0"/>
-              <a:t>01/02/2018</a:t>
+              <a:t>02/02/2018</a:t>
             </a:fld>
             <a:endParaRPr lang="en-GB"/>
           </a:p>
@@ -5558,7 +5567,7 @@
           <a:p>
             <a:fld id="{0E2971E3-340D-4824-B827-22EA8E515B0F}" type="datetimeFigureOut">
               <a:rPr lang="en-GB" smtClean="0"/>
-              <a:t>01/02/2018</a:t>
+              <a:t>02/02/2018</a:t>
             </a:fld>
             <a:endParaRPr lang="en-GB"/>
           </a:p>
@@ -6138,7 +6147,7 @@
         <p:spPr/>
         <p:txBody>
           <a:bodyPr>
-            <a:normAutofit fontScale="92500" lnSpcReduction="10000"/>
+            <a:normAutofit fontScale="92500" lnSpcReduction="20000"/>
           </a:bodyPr>
           <a:lstStyle/>
           <a:p>
@@ -6199,6 +6208,12 @@
             <a:r>
               <a:rPr lang="en-GB" dirty="0"/>
               <a:t>Human readable logs should look good in Notepad and Configuration Manager Trace Tool</a:t>
+            </a:r>
+          </a:p>
+          <a:p>
+            <a:r>
+              <a:rPr lang="en-GB" dirty="0"/>
+              <a:t>Comment based help</a:t>
             </a:r>
           </a:p>
         </p:txBody>

</xml_diff>

<commit_message>
Added agenda slide to pptx
</commit_message>
<xml_diff>
--- a/Design Goals pptx/Write-Log design goals.pptx
+++ b/Design Goals pptx/Write-Log design goals.pptx
@@ -4,8 +4,12 @@
   <p:sldMasterIdLst>
     <p:sldMasterId id="2147483660" r:id="rId1"/>
   </p:sldMasterIdLst>
+  <p:notesMasterIdLst>
+    <p:notesMasterId r:id="rId4"/>
+  </p:notesMasterIdLst>
   <p:sldIdLst>
-    <p:sldId id="257" r:id="rId2"/>
+    <p:sldId id="258" r:id="rId2"/>
+    <p:sldId id="257" r:id="rId3"/>
   </p:sldIdLst>
   <p:sldSz cx="12192000" cy="6858000"/>
   <p:notesSz cx="6858000" cy="9144000"/>
@@ -116,6 +120,356 @@
 <p1510:revInfo xmlns:a="http://schemas.openxmlformats.org/drawingml/2006/main" xmlns:r="http://schemas.openxmlformats.org/officeDocument/2006/relationships" xmlns:p1510="http://schemas.microsoft.com/office/powerpoint/2015/10/main"/>
 </file>
 
+<file path=ppt/notesMasters/notesMaster1.xml><?xml version="1.0" encoding="utf-8"?>
+<p:notesMaster xmlns:a="http://schemas.openxmlformats.org/drawingml/2006/main" xmlns:r="http://schemas.openxmlformats.org/officeDocument/2006/relationships" xmlns:p="http://schemas.openxmlformats.org/presentationml/2006/main">
+  <p:cSld>
+    <p:bg>
+      <p:bgRef idx="1001">
+        <a:schemeClr val="bg1"/>
+      </p:bgRef>
+    </p:bg>
+    <p:spTree>
+      <p:nvGrpSpPr>
+        <p:cNvPr id="1" name=""/>
+        <p:cNvGrpSpPr/>
+        <p:nvPr/>
+      </p:nvGrpSpPr>
+      <p:grpSpPr>
+        <a:xfrm>
+          <a:off x="0" y="0"/>
+          <a:ext cx="0" cy="0"/>
+          <a:chOff x="0" y="0"/>
+          <a:chExt cx="0" cy="0"/>
+        </a:xfrm>
+      </p:grpSpPr>
+      <p:sp>
+        <p:nvSpPr>
+          <p:cNvPr id="2" name="Header Placeholder 1"/>
+          <p:cNvSpPr>
+            <a:spLocks noGrp="1"/>
+          </p:cNvSpPr>
+          <p:nvPr>
+            <p:ph type="hdr" sz="quarter"/>
+          </p:nvPr>
+        </p:nvSpPr>
+        <p:spPr>
+          <a:xfrm>
+            <a:off x="0" y="0"/>
+            <a:ext cx="2971800" cy="458788"/>
+          </a:xfrm>
+          <a:prstGeom prst="rect">
+            <a:avLst/>
+          </a:prstGeom>
+        </p:spPr>
+        <p:txBody>
+          <a:bodyPr vert="horz" lIns="91440" tIns="45720" rIns="91440" bIns="45720" rtlCol="0"/>
+          <a:lstStyle>
+            <a:lvl1pPr algn="l">
+              <a:defRPr sz="1200"/>
+            </a:lvl1pPr>
+          </a:lstStyle>
+          <a:p>
+            <a:endParaRPr lang="en-GB"/>
+          </a:p>
+        </p:txBody>
+      </p:sp>
+      <p:sp>
+        <p:nvSpPr>
+          <p:cNvPr id="3" name="Date Placeholder 2"/>
+          <p:cNvSpPr>
+            <a:spLocks noGrp="1"/>
+          </p:cNvSpPr>
+          <p:nvPr>
+            <p:ph type="dt" idx="1"/>
+          </p:nvPr>
+        </p:nvSpPr>
+        <p:spPr>
+          <a:xfrm>
+            <a:off x="3884613" y="0"/>
+            <a:ext cx="2971800" cy="458788"/>
+          </a:xfrm>
+          <a:prstGeom prst="rect">
+            <a:avLst/>
+          </a:prstGeom>
+        </p:spPr>
+        <p:txBody>
+          <a:bodyPr vert="horz" lIns="91440" tIns="45720" rIns="91440" bIns="45720" rtlCol="0"/>
+          <a:lstStyle>
+            <a:lvl1pPr algn="r">
+              <a:defRPr sz="1200"/>
+            </a:lvl1pPr>
+          </a:lstStyle>
+          <a:p>
+            <a:fld id="{102F7FC1-B21E-4D70-B766-E775F57CFF14}" type="datetimeFigureOut">
+              <a:rPr lang="en-GB" smtClean="0"/>
+              <a:t>06/02/2018</a:t>
+            </a:fld>
+            <a:endParaRPr lang="en-GB"/>
+          </a:p>
+        </p:txBody>
+      </p:sp>
+      <p:sp>
+        <p:nvSpPr>
+          <p:cNvPr id="4" name="Slide Image Placeholder 3"/>
+          <p:cNvSpPr>
+            <a:spLocks noGrp="1" noRot="1" noChangeAspect="1"/>
+          </p:cNvSpPr>
+          <p:nvPr>
+            <p:ph type="sldImg" idx="2"/>
+          </p:nvPr>
+        </p:nvSpPr>
+        <p:spPr>
+          <a:xfrm>
+            <a:off x="685800" y="1143000"/>
+            <a:ext cx="5486400" cy="3086100"/>
+          </a:xfrm>
+          <a:prstGeom prst="rect">
+            <a:avLst/>
+          </a:prstGeom>
+          <a:noFill/>
+          <a:ln w="12700">
+            <a:solidFill>
+              <a:prstClr val="black"/>
+            </a:solidFill>
+          </a:ln>
+        </p:spPr>
+        <p:txBody>
+          <a:bodyPr vert="horz" lIns="91440" tIns="45720" rIns="91440" bIns="45720" rtlCol="0" anchor="ctr"/>
+          <a:lstStyle/>
+          <a:p>
+            <a:endParaRPr lang="en-GB"/>
+          </a:p>
+        </p:txBody>
+      </p:sp>
+      <p:sp>
+        <p:nvSpPr>
+          <p:cNvPr id="5" name="Notes Placeholder 4"/>
+          <p:cNvSpPr>
+            <a:spLocks noGrp="1"/>
+          </p:cNvSpPr>
+          <p:nvPr>
+            <p:ph type="body" sz="quarter" idx="3"/>
+          </p:nvPr>
+        </p:nvSpPr>
+        <p:spPr>
+          <a:xfrm>
+            <a:off x="685800" y="4400550"/>
+            <a:ext cx="5486400" cy="3600450"/>
+          </a:xfrm>
+          <a:prstGeom prst="rect">
+            <a:avLst/>
+          </a:prstGeom>
+        </p:spPr>
+        <p:txBody>
+          <a:bodyPr vert="horz" lIns="91440" tIns="45720" rIns="91440" bIns="45720" rtlCol="0"/>
+          <a:lstStyle/>
+          <a:p>
+            <a:pPr lvl="0"/>
+            <a:r>
+              <a:rPr lang="en-US"/>
+              <a:t>Edit Master text styles</a:t>
+            </a:r>
+          </a:p>
+          <a:p>
+            <a:pPr lvl="1"/>
+            <a:r>
+              <a:rPr lang="en-US"/>
+              <a:t>Second level</a:t>
+            </a:r>
+          </a:p>
+          <a:p>
+            <a:pPr lvl="2"/>
+            <a:r>
+              <a:rPr lang="en-US"/>
+              <a:t>Third level</a:t>
+            </a:r>
+          </a:p>
+          <a:p>
+            <a:pPr lvl="3"/>
+            <a:r>
+              <a:rPr lang="en-US"/>
+              <a:t>Fourth level</a:t>
+            </a:r>
+          </a:p>
+          <a:p>
+            <a:pPr lvl="4"/>
+            <a:r>
+              <a:rPr lang="en-US"/>
+              <a:t>Fifth level</a:t>
+            </a:r>
+            <a:endParaRPr lang="en-GB"/>
+          </a:p>
+        </p:txBody>
+      </p:sp>
+      <p:sp>
+        <p:nvSpPr>
+          <p:cNvPr id="6" name="Footer Placeholder 5"/>
+          <p:cNvSpPr>
+            <a:spLocks noGrp="1"/>
+          </p:cNvSpPr>
+          <p:nvPr>
+            <p:ph type="ftr" sz="quarter" idx="4"/>
+          </p:nvPr>
+        </p:nvSpPr>
+        <p:spPr>
+          <a:xfrm>
+            <a:off x="0" y="8685213"/>
+            <a:ext cx="2971800" cy="458787"/>
+          </a:xfrm>
+          <a:prstGeom prst="rect">
+            <a:avLst/>
+          </a:prstGeom>
+        </p:spPr>
+        <p:txBody>
+          <a:bodyPr vert="horz" lIns="91440" tIns="45720" rIns="91440" bIns="45720" rtlCol="0" anchor="b"/>
+          <a:lstStyle>
+            <a:lvl1pPr algn="l">
+              <a:defRPr sz="1200"/>
+            </a:lvl1pPr>
+          </a:lstStyle>
+          <a:p>
+            <a:endParaRPr lang="en-GB"/>
+          </a:p>
+        </p:txBody>
+      </p:sp>
+      <p:sp>
+        <p:nvSpPr>
+          <p:cNvPr id="7" name="Slide Number Placeholder 6"/>
+          <p:cNvSpPr>
+            <a:spLocks noGrp="1"/>
+          </p:cNvSpPr>
+          <p:nvPr>
+            <p:ph type="sldNum" sz="quarter" idx="5"/>
+          </p:nvPr>
+        </p:nvSpPr>
+        <p:spPr>
+          <a:xfrm>
+            <a:off x="3884613" y="8685213"/>
+            <a:ext cx="2971800" cy="458787"/>
+          </a:xfrm>
+          <a:prstGeom prst="rect">
+            <a:avLst/>
+          </a:prstGeom>
+        </p:spPr>
+        <p:txBody>
+          <a:bodyPr vert="horz" lIns="91440" tIns="45720" rIns="91440" bIns="45720" rtlCol="0" anchor="b"/>
+          <a:lstStyle>
+            <a:lvl1pPr algn="r">
+              <a:defRPr sz="1200"/>
+            </a:lvl1pPr>
+          </a:lstStyle>
+          <a:p>
+            <a:fld id="{A862074A-B190-4CC5-9371-A82099D27299}" type="slidenum">
+              <a:rPr lang="en-GB" smtClean="0"/>
+              <a:t>‹#›</a:t>
+            </a:fld>
+            <a:endParaRPr lang="en-GB"/>
+          </a:p>
+        </p:txBody>
+      </p:sp>
+    </p:spTree>
+    <p:extLst>
+      <p:ext uri="{BB962C8B-B14F-4D97-AF65-F5344CB8AC3E}">
+        <p14:creationId xmlns:p14="http://schemas.microsoft.com/office/powerpoint/2010/main" val="3536521512"/>
+      </p:ext>
+    </p:extLst>
+  </p:cSld>
+  <p:clrMap bg1="lt1" tx1="dk1" bg2="lt2" tx2="dk2" accent1="accent1" accent2="accent2" accent3="accent3" accent4="accent4" accent5="accent5" accent6="accent6" hlink="hlink" folHlink="folHlink"/>
+  <p:notesStyle>
+    <a:lvl1pPr marL="0" algn="l" defTabSz="914400" rtl="0" eaLnBrk="1" latinLnBrk="0" hangingPunct="1">
+      <a:defRPr sz="1200" kern="1200">
+        <a:solidFill>
+          <a:schemeClr val="tx1"/>
+        </a:solidFill>
+        <a:latin typeface="+mn-lt"/>
+        <a:ea typeface="+mn-ea"/>
+        <a:cs typeface="+mn-cs"/>
+      </a:defRPr>
+    </a:lvl1pPr>
+    <a:lvl2pPr marL="457200" algn="l" defTabSz="914400" rtl="0" eaLnBrk="1" latinLnBrk="0" hangingPunct="1">
+      <a:defRPr sz="1200" kern="1200">
+        <a:solidFill>
+          <a:schemeClr val="tx1"/>
+        </a:solidFill>
+        <a:latin typeface="+mn-lt"/>
+        <a:ea typeface="+mn-ea"/>
+        <a:cs typeface="+mn-cs"/>
+      </a:defRPr>
+    </a:lvl2pPr>
+    <a:lvl3pPr marL="914400" algn="l" defTabSz="914400" rtl="0" eaLnBrk="1" latinLnBrk="0" hangingPunct="1">
+      <a:defRPr sz="1200" kern="1200">
+        <a:solidFill>
+          <a:schemeClr val="tx1"/>
+        </a:solidFill>
+        <a:latin typeface="+mn-lt"/>
+        <a:ea typeface="+mn-ea"/>
+        <a:cs typeface="+mn-cs"/>
+      </a:defRPr>
+    </a:lvl3pPr>
+    <a:lvl4pPr marL="1371600" algn="l" defTabSz="914400" rtl="0" eaLnBrk="1" latinLnBrk="0" hangingPunct="1">
+      <a:defRPr sz="1200" kern="1200">
+        <a:solidFill>
+          <a:schemeClr val="tx1"/>
+        </a:solidFill>
+        <a:latin typeface="+mn-lt"/>
+        <a:ea typeface="+mn-ea"/>
+        <a:cs typeface="+mn-cs"/>
+      </a:defRPr>
+    </a:lvl4pPr>
+    <a:lvl5pPr marL="1828800" algn="l" defTabSz="914400" rtl="0" eaLnBrk="1" latinLnBrk="0" hangingPunct="1">
+      <a:defRPr sz="1200" kern="1200">
+        <a:solidFill>
+          <a:schemeClr val="tx1"/>
+        </a:solidFill>
+        <a:latin typeface="+mn-lt"/>
+        <a:ea typeface="+mn-ea"/>
+        <a:cs typeface="+mn-cs"/>
+      </a:defRPr>
+    </a:lvl5pPr>
+    <a:lvl6pPr marL="2286000" algn="l" defTabSz="914400" rtl="0" eaLnBrk="1" latinLnBrk="0" hangingPunct="1">
+      <a:defRPr sz="1200" kern="1200">
+        <a:solidFill>
+          <a:schemeClr val="tx1"/>
+        </a:solidFill>
+        <a:latin typeface="+mn-lt"/>
+        <a:ea typeface="+mn-ea"/>
+        <a:cs typeface="+mn-cs"/>
+      </a:defRPr>
+    </a:lvl6pPr>
+    <a:lvl7pPr marL="2743200" algn="l" defTabSz="914400" rtl="0" eaLnBrk="1" latinLnBrk="0" hangingPunct="1">
+      <a:defRPr sz="1200" kern="1200">
+        <a:solidFill>
+          <a:schemeClr val="tx1"/>
+        </a:solidFill>
+        <a:latin typeface="+mn-lt"/>
+        <a:ea typeface="+mn-ea"/>
+        <a:cs typeface="+mn-cs"/>
+      </a:defRPr>
+    </a:lvl7pPr>
+    <a:lvl8pPr marL="3200400" algn="l" defTabSz="914400" rtl="0" eaLnBrk="1" latinLnBrk="0" hangingPunct="1">
+      <a:defRPr sz="1200" kern="1200">
+        <a:solidFill>
+          <a:schemeClr val="tx1"/>
+        </a:solidFill>
+        <a:latin typeface="+mn-lt"/>
+        <a:ea typeface="+mn-ea"/>
+        <a:cs typeface="+mn-cs"/>
+      </a:defRPr>
+    </a:lvl8pPr>
+    <a:lvl9pPr marL="3657600" algn="l" defTabSz="914400" rtl="0" eaLnBrk="1" latinLnBrk="0" hangingPunct="1">
+      <a:defRPr sz="1200" kern="1200">
+        <a:solidFill>
+          <a:schemeClr val="tx1"/>
+        </a:solidFill>
+        <a:latin typeface="+mn-lt"/>
+        <a:ea typeface="+mn-ea"/>
+        <a:cs typeface="+mn-cs"/>
+      </a:defRPr>
+    </a:lvl9pPr>
+  </p:notesStyle>
+</p:notesMaster>
+</file>
+
 <file path=ppt/slideLayouts/slideLayout1.xml><?xml version="1.0" encoding="utf-8"?>
 <p:sldLayout xmlns:a="http://schemas.openxmlformats.org/drawingml/2006/main" xmlns:r="http://schemas.openxmlformats.org/officeDocument/2006/relationships" xmlns:p="http://schemas.openxmlformats.org/presentationml/2006/main" type="title" preserve="1">
   <p:cSld name="Title Slide">
@@ -300,9 +654,9 @@
           <a:bodyPr/>
           <a:lstStyle/>
           <a:p>
-            <a:fld id="{0E2971E3-340D-4824-B827-22EA8E515B0F}" type="datetimeFigureOut">
+            <a:fld id="{FFB01E18-4CCF-485A-973C-3368A927D644}" type="datetime1">
               <a:rPr lang="en-GB" smtClean="0"/>
-              <a:t>02/02/2018</a:t>
+              <a:t>06/02/2018</a:t>
             </a:fld>
             <a:endParaRPr lang="en-GB"/>
           </a:p>
@@ -323,7 +677,10 @@
           <a:bodyPr/>
           <a:lstStyle/>
           <a:p>
-            <a:endParaRPr lang="en-GB"/>
+            <a:r>
+              <a:rPr lang="en-GB"/>
+              <a:t>Twitter: @JimMoyle</a:t>
+            </a:r>
           </a:p>
         </p:txBody>
       </p:sp>
@@ -575,9 +932,9 @@
           <a:bodyPr/>
           <a:lstStyle/>
           <a:p>
-            <a:fld id="{0E2971E3-340D-4824-B827-22EA8E515B0F}" type="datetimeFigureOut">
+            <a:fld id="{6B136DAE-6D16-469C-A893-707F05402944}" type="datetime1">
               <a:rPr lang="en-GB" smtClean="0"/>
-              <a:t>02/02/2018</a:t>
+              <a:t>06/02/2018</a:t>
             </a:fld>
             <a:endParaRPr lang="en-GB"/>
           </a:p>
@@ -598,7 +955,10 @@
           <a:bodyPr/>
           <a:lstStyle/>
           <a:p>
-            <a:endParaRPr lang="en-GB"/>
+            <a:r>
+              <a:rPr lang="en-GB"/>
+              <a:t>Twitter: @JimMoyle</a:t>
+            </a:r>
           </a:p>
         </p:txBody>
       </p:sp>
@@ -769,9 +1129,9 @@
           <a:bodyPr/>
           <a:lstStyle/>
           <a:p>
-            <a:fld id="{0E2971E3-340D-4824-B827-22EA8E515B0F}" type="datetimeFigureOut">
+            <a:fld id="{88393952-4671-4469-960B-61357D269570}" type="datetime1">
               <a:rPr lang="en-GB" smtClean="0"/>
-              <a:t>02/02/2018</a:t>
+              <a:t>06/02/2018</a:t>
             </a:fld>
             <a:endParaRPr lang="en-GB"/>
           </a:p>
@@ -792,7 +1152,10 @@
           <a:bodyPr/>
           <a:lstStyle/>
           <a:p>
-            <a:endParaRPr lang="en-GB"/>
+            <a:r>
+              <a:rPr lang="en-GB"/>
+              <a:t>Twitter: @JimMoyle</a:t>
+            </a:r>
           </a:p>
         </p:txBody>
       </p:sp>
@@ -1042,9 +1405,9 @@
           <a:bodyPr/>
           <a:lstStyle/>
           <a:p>
-            <a:fld id="{0E2971E3-340D-4824-B827-22EA8E515B0F}" type="datetimeFigureOut">
+            <a:fld id="{DE198B09-3539-4140-BC4F-85691395AE64}" type="datetime1">
               <a:rPr lang="en-GB" smtClean="0"/>
-              <a:t>02/02/2018</a:t>
+              <a:t>06/02/2018</a:t>
             </a:fld>
             <a:endParaRPr lang="en-GB"/>
           </a:p>
@@ -1065,7 +1428,10 @@
           <a:bodyPr/>
           <a:lstStyle/>
           <a:p>
-            <a:endParaRPr lang="en-GB"/>
+            <a:r>
+              <a:rPr lang="en-GB"/>
+              <a:t>Twitter: @JimMoyle</a:t>
+            </a:r>
           </a:p>
         </p:txBody>
       </p:sp>
@@ -1383,9 +1749,9 @@
           <a:bodyPr/>
           <a:lstStyle/>
           <a:p>
-            <a:fld id="{0E2971E3-340D-4824-B827-22EA8E515B0F}" type="datetimeFigureOut">
+            <a:fld id="{4B50215B-8CF9-4B59-95C9-A1D81365ED74}" type="datetime1">
               <a:rPr lang="en-GB" smtClean="0"/>
-              <a:t>02/02/2018</a:t>
+              <a:t>06/02/2018</a:t>
             </a:fld>
             <a:endParaRPr lang="en-GB"/>
           </a:p>
@@ -1406,7 +1772,10 @@
           <a:bodyPr/>
           <a:lstStyle/>
           <a:p>
-            <a:endParaRPr lang="en-GB"/>
+            <a:r>
+              <a:rPr lang="en-GB"/>
+              <a:t>Twitter: @JimMoyle</a:t>
+            </a:r>
           </a:p>
         </p:txBody>
       </p:sp>
@@ -2006,9 +2375,9 @@
           <a:bodyPr/>
           <a:lstStyle/>
           <a:p>
-            <a:fld id="{0E2971E3-340D-4824-B827-22EA8E515B0F}" type="datetimeFigureOut">
+            <a:fld id="{86676B25-2AE1-46DF-95B1-9541FED5CB40}" type="datetime1">
               <a:rPr lang="en-GB" smtClean="0"/>
-              <a:t>02/02/2018</a:t>
+              <a:t>06/02/2018</a:t>
             </a:fld>
             <a:endParaRPr lang="en-GB"/>
           </a:p>
@@ -2029,7 +2398,10 @@
           <a:bodyPr/>
           <a:lstStyle/>
           <a:p>
-            <a:endParaRPr lang="en-GB"/>
+            <a:r>
+              <a:rPr lang="en-GB"/>
+              <a:t>Twitter: @JimMoyle</a:t>
+            </a:r>
           </a:p>
         </p:txBody>
       </p:sp>
@@ -2866,9 +3238,9 @@
           <a:bodyPr/>
           <a:lstStyle/>
           <a:p>
-            <a:fld id="{0E2971E3-340D-4824-B827-22EA8E515B0F}" type="datetimeFigureOut">
+            <a:fld id="{C64BDC7E-23B0-4D74-952F-1B0A487A6440}" type="datetime1">
               <a:rPr lang="en-GB" smtClean="0"/>
-              <a:t>02/02/2018</a:t>
+              <a:t>06/02/2018</a:t>
             </a:fld>
             <a:endParaRPr lang="en-GB"/>
           </a:p>
@@ -2889,7 +3261,10 @@
           <a:bodyPr/>
           <a:lstStyle/>
           <a:p>
-            <a:endParaRPr lang="en-GB"/>
+            <a:r>
+              <a:rPr lang="en-GB"/>
+              <a:t>Twitter: @JimMoyle</a:t>
+            </a:r>
           </a:p>
         </p:txBody>
       </p:sp>
@@ -3036,9 +3411,9 @@
           <a:bodyPr/>
           <a:lstStyle/>
           <a:p>
-            <a:fld id="{0E2971E3-340D-4824-B827-22EA8E515B0F}" type="datetimeFigureOut">
+            <a:fld id="{A7440DDA-6E3F-4D76-B9CE-2B8C251B5372}" type="datetime1">
               <a:rPr lang="en-GB" smtClean="0"/>
-              <a:t>02/02/2018</a:t>
+              <a:t>06/02/2018</a:t>
             </a:fld>
             <a:endParaRPr lang="en-GB"/>
           </a:p>
@@ -3059,7 +3434,10 @@
           <a:bodyPr/>
           <a:lstStyle/>
           <a:p>
-            <a:endParaRPr lang="en-GB"/>
+            <a:r>
+              <a:rPr lang="en-GB"/>
+              <a:t>Twitter: @JimMoyle</a:t>
+            </a:r>
           </a:p>
         </p:txBody>
       </p:sp>
@@ -3216,9 +3594,9 @@
           <a:bodyPr/>
           <a:lstStyle/>
           <a:p>
-            <a:fld id="{0E2971E3-340D-4824-B827-22EA8E515B0F}" type="datetimeFigureOut">
+            <a:fld id="{6CF90DDC-9D4A-4C2F-8E02-A98B324260DA}" type="datetime1">
               <a:rPr lang="en-GB" smtClean="0"/>
-              <a:t>02/02/2018</a:t>
+              <a:t>06/02/2018</a:t>
             </a:fld>
             <a:endParaRPr lang="en-GB"/>
           </a:p>
@@ -3239,7 +3617,10 @@
           <a:bodyPr/>
           <a:lstStyle/>
           <a:p>
-            <a:endParaRPr lang="en-GB"/>
+            <a:r>
+              <a:rPr lang="en-GB"/>
+              <a:t>Twitter: @JimMoyle</a:t>
+            </a:r>
           </a:p>
         </p:txBody>
       </p:sp>
@@ -3386,9 +3767,9 @@
           <a:bodyPr/>
           <a:lstStyle/>
           <a:p>
-            <a:fld id="{0E2971E3-340D-4824-B827-22EA8E515B0F}" type="datetimeFigureOut">
+            <a:fld id="{FFA8A3FE-D1BD-4574-85D8-D514F4BA8422}" type="datetime1">
               <a:rPr lang="en-GB" smtClean="0"/>
-              <a:t>02/02/2018</a:t>
+              <a:t>06/02/2018</a:t>
             </a:fld>
             <a:endParaRPr lang="en-GB"/>
           </a:p>
@@ -3409,7 +3790,10 @@
           <a:bodyPr/>
           <a:lstStyle/>
           <a:p>
-            <a:endParaRPr lang="en-GB"/>
+            <a:r>
+              <a:rPr lang="en-GB"/>
+              <a:t>Twitter: @JimMoyle</a:t>
+            </a:r>
           </a:p>
         </p:txBody>
       </p:sp>
@@ -3633,9 +4017,9 @@
           <a:bodyPr/>
           <a:lstStyle/>
           <a:p>
-            <a:fld id="{0E2971E3-340D-4824-B827-22EA8E515B0F}" type="datetimeFigureOut">
+            <a:fld id="{8F4B27B8-AF3B-43A2-BB32-CF519CE75837}" type="datetime1">
               <a:rPr lang="en-GB" smtClean="0"/>
-              <a:t>02/02/2018</a:t>
+              <a:t>06/02/2018</a:t>
             </a:fld>
             <a:endParaRPr lang="en-GB"/>
           </a:p>
@@ -3656,7 +4040,10 @@
           <a:bodyPr/>
           <a:lstStyle/>
           <a:p>
-            <a:endParaRPr lang="en-GB"/>
+            <a:r>
+              <a:rPr lang="en-GB"/>
+              <a:t>Twitter: @JimMoyle</a:t>
+            </a:r>
           </a:p>
         </p:txBody>
       </p:sp>
@@ -3925,9 +4312,9 @@
           <a:bodyPr/>
           <a:lstStyle/>
           <a:p>
-            <a:fld id="{0E2971E3-340D-4824-B827-22EA8E515B0F}" type="datetimeFigureOut">
+            <a:fld id="{66F316C1-B30C-4BC6-89C9-B80B5CDB7374}" type="datetime1">
               <a:rPr lang="en-GB" smtClean="0"/>
-              <a:t>02/02/2018</a:t>
+              <a:t>06/02/2018</a:t>
             </a:fld>
             <a:endParaRPr lang="en-GB"/>
           </a:p>
@@ -3948,7 +4335,10 @@
           <a:bodyPr/>
           <a:lstStyle/>
           <a:p>
-            <a:endParaRPr lang="en-GB"/>
+            <a:r>
+              <a:rPr lang="en-GB"/>
+              <a:t>Twitter: @JimMoyle</a:t>
+            </a:r>
           </a:p>
         </p:txBody>
       </p:sp>
@@ -4369,9 +4759,9 @@
           <a:bodyPr/>
           <a:lstStyle/>
           <a:p>
-            <a:fld id="{0E2971E3-340D-4824-B827-22EA8E515B0F}" type="datetimeFigureOut">
+            <a:fld id="{813D90DC-5067-46D1-8A4E-C4259DAB6354}" type="datetime1">
               <a:rPr lang="en-GB" smtClean="0"/>
-              <a:t>02/02/2018</a:t>
+              <a:t>06/02/2018</a:t>
             </a:fld>
             <a:endParaRPr lang="en-GB"/>
           </a:p>
@@ -4392,7 +4782,10 @@
           <a:bodyPr/>
           <a:lstStyle/>
           <a:p>
-            <a:endParaRPr lang="en-GB"/>
+            <a:r>
+              <a:rPr lang="en-GB"/>
+              <a:t>Twitter: @JimMoyle</a:t>
+            </a:r>
           </a:p>
         </p:txBody>
       </p:sp>
@@ -4487,9 +4880,9 @@
           <a:bodyPr/>
           <a:lstStyle/>
           <a:p>
-            <a:fld id="{0E2971E3-340D-4824-B827-22EA8E515B0F}" type="datetimeFigureOut">
+            <a:fld id="{50B3F8FC-087D-4D20-BD2E-4C6FC66633DC}" type="datetime1">
               <a:rPr lang="en-GB" smtClean="0"/>
-              <a:t>02/02/2018</a:t>
+              <a:t>06/02/2018</a:t>
             </a:fld>
             <a:endParaRPr lang="en-GB"/>
           </a:p>
@@ -4510,7 +4903,10 @@
           <a:bodyPr/>
           <a:lstStyle/>
           <a:p>
-            <a:endParaRPr lang="en-GB"/>
+            <a:r>
+              <a:rPr lang="en-GB"/>
+              <a:t>Twitter: @JimMoyle</a:t>
+            </a:r>
           </a:p>
         </p:txBody>
       </p:sp>
@@ -4582,9 +4978,9 @@
           <a:bodyPr/>
           <a:lstStyle/>
           <a:p>
-            <a:fld id="{0E2971E3-340D-4824-B827-22EA8E515B0F}" type="datetimeFigureOut">
+            <a:fld id="{289F9F86-0B0B-4593-B854-8F0B6D47FBE7}" type="datetime1">
               <a:rPr lang="en-GB" smtClean="0"/>
-              <a:t>02/02/2018</a:t>
+              <a:t>06/02/2018</a:t>
             </a:fld>
             <a:endParaRPr lang="en-GB"/>
           </a:p>
@@ -4605,7 +5001,10 @@
           <a:bodyPr/>
           <a:lstStyle/>
           <a:p>
-            <a:endParaRPr lang="en-GB"/>
+            <a:r>
+              <a:rPr lang="en-GB"/>
+              <a:t>Twitter: @JimMoyle</a:t>
+            </a:r>
           </a:p>
         </p:txBody>
       </p:sp>
@@ -4861,9 +5260,9 @@
           <a:bodyPr/>
           <a:lstStyle/>
           <a:p>
-            <a:fld id="{0E2971E3-340D-4824-B827-22EA8E515B0F}" type="datetimeFigureOut">
+            <a:fld id="{EDDD97C9-BB1F-4383-A2FB-16C3FFE1D6D3}" type="datetime1">
               <a:rPr lang="en-GB" smtClean="0"/>
-              <a:t>02/02/2018</a:t>
+              <a:t>06/02/2018</a:t>
             </a:fld>
             <a:endParaRPr lang="en-GB"/>
           </a:p>
@@ -4884,7 +5283,10 @@
           <a:bodyPr/>
           <a:lstStyle/>
           <a:p>
-            <a:endParaRPr lang="en-GB"/>
+            <a:r>
+              <a:rPr lang="en-GB"/>
+              <a:t>Twitter: @JimMoyle</a:t>
+            </a:r>
           </a:p>
         </p:txBody>
       </p:sp>
@@ -5136,9 +5538,9 @@
           <a:bodyPr/>
           <a:lstStyle/>
           <a:p>
-            <a:fld id="{0E2971E3-340D-4824-B827-22EA8E515B0F}" type="datetimeFigureOut">
+            <a:fld id="{D6C2AA35-846A-40E4-830D-15CF4BD67F5E}" type="datetime1">
               <a:rPr lang="en-GB" smtClean="0"/>
-              <a:t>02/02/2018</a:t>
+              <a:t>06/02/2018</a:t>
             </a:fld>
             <a:endParaRPr lang="en-GB"/>
           </a:p>
@@ -5159,7 +5561,10 @@
           <a:bodyPr/>
           <a:lstStyle/>
           <a:p>
-            <a:endParaRPr lang="en-GB"/>
+            <a:r>
+              <a:rPr lang="en-GB"/>
+              <a:t>Twitter: @JimMoyle</a:t>
+            </a:r>
           </a:p>
         </p:txBody>
       </p:sp>
@@ -5565,9 +5970,9 @@
             </a:lvl1pPr>
           </a:lstStyle>
           <a:p>
-            <a:fld id="{0E2971E3-340D-4824-B827-22EA8E515B0F}" type="datetimeFigureOut">
+            <a:fld id="{E9C9FC63-C035-45F8-BAC6-BBAE95C793D2}" type="datetime1">
               <a:rPr lang="en-GB" smtClean="0"/>
-              <a:t>02/02/2018</a:t>
+              <a:t>06/02/2018</a:t>
             </a:fld>
             <a:endParaRPr lang="en-GB"/>
           </a:p>
@@ -5607,7 +6012,10 @@
             </a:lvl1pPr>
           </a:lstStyle>
           <a:p>
-            <a:endParaRPr lang="en-GB"/>
+            <a:r>
+              <a:rPr lang="en-GB"/>
+              <a:t>Twitter: @JimMoyle</a:t>
+            </a:r>
           </a:p>
         </p:txBody>
       </p:sp>
@@ -5679,6 +6087,7 @@
     <p:sldLayoutId id="2147483676" r:id="rId16"/>
     <p:sldLayoutId id="2147483677" r:id="rId17"/>
   </p:sldLayoutIdLst>
+  <p:hf sldNum="0" hdr="0" dt="0"/>
   <p:txStyles>
     <p:titleStyle>
       <a:lvl1pPr algn="l" defTabSz="457200" rtl="0" eaLnBrk="1" latinLnBrk="0" hangingPunct="1">
@@ -6097,6 +6506,152 @@
       </p:grpSpPr>
       <p:sp>
         <p:nvSpPr>
+          <p:cNvPr id="4" name="Title 3">
+            <a:extLst>
+              <a:ext uri="{FF2B5EF4-FFF2-40B4-BE49-F238E27FC236}">
+                <a16:creationId xmlns:a16="http://schemas.microsoft.com/office/drawing/2014/main" id="{E5239284-4864-40F0-8B55-D47AB258DC72}"/>
+              </a:ext>
+            </a:extLst>
+          </p:cNvPr>
+          <p:cNvSpPr>
+            <a:spLocks noGrp="1"/>
+          </p:cNvSpPr>
+          <p:nvPr>
+            <p:ph type="title"/>
+          </p:nvPr>
+        </p:nvSpPr>
+        <p:spPr/>
+        <p:txBody>
+          <a:bodyPr/>
+          <a:lstStyle/>
+          <a:p>
+            <a:r>
+              <a:rPr lang="en-GB" sz="4000" dirty="0"/>
+              <a:t>Worked Example of a public function</a:t>
+            </a:r>
+          </a:p>
+        </p:txBody>
+      </p:sp>
+      <p:sp>
+        <p:nvSpPr>
+          <p:cNvPr id="5" name="Content Placeholder 4">
+            <a:extLst>
+              <a:ext uri="{FF2B5EF4-FFF2-40B4-BE49-F238E27FC236}">
+                <a16:creationId xmlns:a16="http://schemas.microsoft.com/office/drawing/2014/main" id="{17E45FE8-8081-4A01-8D96-35DD35CE0AB1}"/>
+              </a:ext>
+            </a:extLst>
+          </p:cNvPr>
+          <p:cNvSpPr>
+            <a:spLocks noGrp="1"/>
+          </p:cNvSpPr>
+          <p:nvPr>
+            <p:ph idx="1"/>
+          </p:nvPr>
+        </p:nvSpPr>
+        <p:spPr/>
+        <p:txBody>
+          <a:bodyPr/>
+          <a:lstStyle/>
+          <a:p>
+            <a:r>
+              <a:rPr lang="en-GB" dirty="0"/>
+              <a:t>Get straight to the code link</a:t>
+            </a:r>
+          </a:p>
+          <a:p>
+            <a:r>
+              <a:rPr lang="en-GB" dirty="0"/>
+              <a:t>Why and how I’ve built the advanced function</a:t>
+            </a:r>
+          </a:p>
+          <a:p>
+            <a:r>
+              <a:rPr lang="en-GB" dirty="0"/>
+              <a:t>Pester testing</a:t>
+            </a:r>
+          </a:p>
+          <a:p>
+            <a:r>
+              <a:rPr lang="en-GB" dirty="0"/>
+              <a:t>CI/CD – Integrating GitHub and </a:t>
+            </a:r>
+            <a:r>
+              <a:rPr lang="en-GB" dirty="0" err="1"/>
+              <a:t>Appveyor</a:t>
+            </a:r>
+            <a:endParaRPr lang="en-GB" dirty="0"/>
+          </a:p>
+          <a:p>
+            <a:r>
+              <a:rPr lang="en-GB" dirty="0"/>
+              <a:t>Pulling function into other repositories</a:t>
+            </a:r>
+          </a:p>
+          <a:p>
+            <a:endParaRPr lang="en-GB" dirty="0"/>
+          </a:p>
+        </p:txBody>
+      </p:sp>
+      <p:sp>
+        <p:nvSpPr>
+          <p:cNvPr id="6" name="Footer Placeholder 5">
+            <a:extLst>
+              <a:ext uri="{FF2B5EF4-FFF2-40B4-BE49-F238E27FC236}">
+                <a16:creationId xmlns:a16="http://schemas.microsoft.com/office/drawing/2014/main" id="{CD618970-86EC-4C49-95C8-B7D213E49A7D}"/>
+              </a:ext>
+            </a:extLst>
+          </p:cNvPr>
+          <p:cNvSpPr>
+            <a:spLocks noGrp="1"/>
+          </p:cNvSpPr>
+          <p:nvPr>
+            <p:ph type="ftr" sz="quarter" idx="11"/>
+          </p:nvPr>
+        </p:nvSpPr>
+        <p:spPr/>
+        <p:txBody>
+          <a:bodyPr/>
+          <a:lstStyle/>
+          <a:p>
+            <a:r>
+              <a:rPr lang="en-GB"/>
+              <a:t>Twitter: @JimMoyle</a:t>
+            </a:r>
+          </a:p>
+        </p:txBody>
+      </p:sp>
+    </p:spTree>
+    <p:extLst>
+      <p:ext uri="{BB962C8B-B14F-4D97-AF65-F5344CB8AC3E}">
+        <p14:creationId xmlns:p14="http://schemas.microsoft.com/office/powerpoint/2010/main" val="601300790"/>
+      </p:ext>
+    </p:extLst>
+  </p:cSld>
+  <p:clrMapOvr>
+    <a:masterClrMapping/>
+  </p:clrMapOvr>
+</p:sld>
+</file>
+
+<file path=ppt/slides/slide2.xml><?xml version="1.0" encoding="utf-8"?>
+<p:sld xmlns:a="http://schemas.openxmlformats.org/drawingml/2006/main" xmlns:r="http://schemas.openxmlformats.org/officeDocument/2006/relationships" xmlns:p="http://schemas.openxmlformats.org/presentationml/2006/main">
+  <p:cSld>
+    <p:spTree>
+      <p:nvGrpSpPr>
+        <p:cNvPr id="1" name=""/>
+        <p:cNvGrpSpPr/>
+        <p:nvPr/>
+      </p:nvGrpSpPr>
+      <p:grpSpPr>
+        <a:xfrm>
+          <a:off x="0" y="0"/>
+          <a:ext cx="0" cy="0"/>
+          <a:chOff x="0" y="0"/>
+          <a:chExt cx="0" cy="0"/>
+        </a:xfrm>
+      </p:grpSpPr>
+      <p:sp>
+        <p:nvSpPr>
           <p:cNvPr id="2" name="Title 1">
             <a:extLst>
               <a:ext uri="{FF2B5EF4-FFF2-40B4-BE49-F238E27FC236}">
@@ -6118,13 +6673,8 @@
           <a:p>
             <a:r>
               <a:rPr lang="en-GB" sz="4000" dirty="0"/>
-              <a:t>Write-Log design goals by @</a:t>
-            </a:r>
-            <a:r>
-              <a:rPr lang="en-GB" sz="4000" dirty="0" err="1"/>
-              <a:t>JimMoyle</a:t>
-            </a:r>
-            <a:endParaRPr lang="en-GB" sz="4000" dirty="0"/>
+              <a:t>Write-Log design goals</a:t>
+            </a:r>
           </a:p>
         </p:txBody>
       </p:sp>
@@ -6214,6 +6764,34 @@
             <a:r>
               <a:rPr lang="en-GB" dirty="0"/>
               <a:t>Comment based help</a:t>
+            </a:r>
+          </a:p>
+        </p:txBody>
+      </p:sp>
+      <p:sp>
+        <p:nvSpPr>
+          <p:cNvPr id="4" name="Footer Placeholder 3">
+            <a:extLst>
+              <a:ext uri="{FF2B5EF4-FFF2-40B4-BE49-F238E27FC236}">
+                <a16:creationId xmlns:a16="http://schemas.microsoft.com/office/drawing/2014/main" id="{17A09460-354B-41DC-8E83-1C9E25E41AF4}"/>
+              </a:ext>
+            </a:extLst>
+          </p:cNvPr>
+          <p:cNvSpPr>
+            <a:spLocks noGrp="1"/>
+          </p:cNvSpPr>
+          <p:nvPr>
+            <p:ph type="ftr" sz="quarter" idx="11"/>
+          </p:nvPr>
+        </p:nvSpPr>
+        <p:spPr/>
+        <p:txBody>
+          <a:bodyPr/>
+          <a:lstStyle/>
+          <a:p>
+            <a:r>
+              <a:rPr lang="en-GB"/>
+              <a:t>Twitter: @JimMoyle</a:t>
             </a:r>
           </a:p>
         </p:txBody>
@@ -6495,4 +7073,299 @@
     </a:ext>
   </a:extLst>
 </a:theme>
+</file>
+
+<file path=ppt/theme/theme2.xml><?xml version="1.0" encoding="utf-8"?>
+<a:theme xmlns:a="http://schemas.openxmlformats.org/drawingml/2006/main" name="Office Theme">
+  <a:themeElements>
+    <a:clrScheme name="Office">
+      <a:dk1>
+        <a:sysClr val="windowText" lastClr="000000"/>
+      </a:dk1>
+      <a:lt1>
+        <a:sysClr val="window" lastClr="FFFFFF"/>
+      </a:lt1>
+      <a:dk2>
+        <a:srgbClr val="44546A"/>
+      </a:dk2>
+      <a:lt2>
+        <a:srgbClr val="E7E6E6"/>
+      </a:lt2>
+      <a:accent1>
+        <a:srgbClr val="4472C4"/>
+      </a:accent1>
+      <a:accent2>
+        <a:srgbClr val="ED7D31"/>
+      </a:accent2>
+      <a:accent3>
+        <a:srgbClr val="A5A5A5"/>
+      </a:accent3>
+      <a:accent4>
+        <a:srgbClr val="FFC000"/>
+      </a:accent4>
+      <a:accent5>
+        <a:srgbClr val="5B9BD5"/>
+      </a:accent5>
+      <a:accent6>
+        <a:srgbClr val="70AD47"/>
+      </a:accent6>
+      <a:hlink>
+        <a:srgbClr val="0563C1"/>
+      </a:hlink>
+      <a:folHlink>
+        <a:srgbClr val="954F72"/>
+      </a:folHlink>
+    </a:clrScheme>
+    <a:fontScheme name="Office">
+      <a:majorFont>
+        <a:latin typeface="Calibri Light" panose="020F0302020204030204"/>
+        <a:ea typeface=""/>
+        <a:cs typeface=""/>
+        <a:font script="Jpan" typeface="游ゴシック Light"/>
+        <a:font script="Hang" typeface="맑은 고딕"/>
+        <a:font script="Hans" typeface="等线 Light"/>
+        <a:font script="Hant" typeface="新細明體"/>
+        <a:font script="Arab" typeface="Times New Roman"/>
+        <a:font script="Hebr" typeface="Times New Roman"/>
+        <a:font script="Thai" typeface="Angsana New"/>
+        <a:font script="Ethi" typeface="Nyala"/>
+        <a:font script="Beng" typeface="Vrinda"/>
+        <a:font script="Gujr" typeface="Shruti"/>
+        <a:font script="Khmr" typeface="MoolBoran"/>
+        <a:font script="Knda" typeface="Tunga"/>
+        <a:font script="Guru" typeface="Raavi"/>
+        <a:font script="Cans" typeface="Euphemia"/>
+        <a:font script="Cher" typeface="Plantagenet Cherokee"/>
+        <a:font script="Yiii" typeface="Microsoft Yi Baiti"/>
+        <a:font script="Tibt" typeface="Microsoft Himalaya"/>
+        <a:font script="Thaa" typeface="MV Boli"/>
+        <a:font script="Deva" typeface="Mangal"/>
+        <a:font script="Telu" typeface="Gautami"/>
+        <a:font script="Taml" typeface="Latha"/>
+        <a:font script="Syrc" typeface="Estrangelo Edessa"/>
+        <a:font script="Orya" typeface="Kalinga"/>
+        <a:font script="Mlym" typeface="Kartika"/>
+        <a:font script="Laoo" typeface="DokChampa"/>
+        <a:font script="Sinh" typeface="Iskoola Pota"/>
+        <a:font script="Mong" typeface="Mongolian Baiti"/>
+        <a:font script="Viet" typeface="Times New Roman"/>
+        <a:font script="Uigh" typeface="Microsoft Uighur"/>
+        <a:font script="Geor" typeface="Sylfaen"/>
+        <a:font script="Armn" typeface="Arial"/>
+        <a:font script="Bugi" typeface="Leelawadee UI"/>
+        <a:font script="Bopo" typeface="Microsoft JhengHei"/>
+        <a:font script="Java" typeface="Javanese Text"/>
+        <a:font script="Lisu" typeface="Segoe UI"/>
+        <a:font script="Mymr" typeface="Myanmar Text"/>
+        <a:font script="Nkoo" typeface="Ebrima"/>
+        <a:font script="Olck" typeface="Nirmala UI"/>
+        <a:font script="Osma" typeface="Ebrima"/>
+        <a:font script="Phag" typeface="Phagspa"/>
+        <a:font script="Syrn" typeface="Estrangelo Edessa"/>
+        <a:font script="Syrj" typeface="Estrangelo Edessa"/>
+        <a:font script="Syre" typeface="Estrangelo Edessa"/>
+        <a:font script="Sora" typeface="Nirmala UI"/>
+        <a:font script="Tale" typeface="Microsoft Tai Le"/>
+        <a:font script="Talu" typeface="Microsoft New Tai Lue"/>
+        <a:font script="Tfng" typeface="Ebrima"/>
+      </a:majorFont>
+      <a:minorFont>
+        <a:latin typeface="Calibri" panose="020F0502020204030204"/>
+        <a:ea typeface=""/>
+        <a:cs typeface=""/>
+        <a:font script="Jpan" typeface="游ゴシック"/>
+        <a:font script="Hang" typeface="맑은 고딕"/>
+        <a:font script="Hans" typeface="等线"/>
+        <a:font script="Hant" typeface="新細明體"/>
+        <a:font script="Arab" typeface="Arial"/>
+        <a:font script="Hebr" typeface="Arial"/>
+        <a:font script="Thai" typeface="Cordia New"/>
+        <a:font script="Ethi" typeface="Nyala"/>
+        <a:font script="Beng" typeface="Vrinda"/>
+        <a:font script="Gujr" typeface="Shruti"/>
+        <a:font script="Khmr" typeface="DaunPenh"/>
+        <a:font script="Knda" typeface="Tunga"/>
+        <a:font script="Guru" typeface="Raavi"/>
+        <a:font script="Cans" typeface="Euphemia"/>
+        <a:font script="Cher" typeface="Plantagenet Cherokee"/>
+        <a:font script="Yiii" typeface="Microsoft Yi Baiti"/>
+        <a:font script="Tibt" typeface="Microsoft Himalaya"/>
+        <a:font script="Thaa" typeface="MV Boli"/>
+        <a:font script="Deva" typeface="Mangal"/>
+        <a:font script="Telu" typeface="Gautami"/>
+        <a:font script="Taml" typeface="Latha"/>
+        <a:font script="Syrc" typeface="Estrangelo Edessa"/>
+        <a:font script="Orya" typeface="Kalinga"/>
+        <a:font script="Mlym" typeface="Kartika"/>
+        <a:font script="Laoo" typeface="DokChampa"/>
+        <a:font script="Sinh" typeface="Iskoola Pota"/>
+        <a:font script="Mong" typeface="Mongolian Baiti"/>
+        <a:font script="Viet" typeface="Arial"/>
+        <a:font script="Uigh" typeface="Microsoft Uighur"/>
+        <a:font script="Geor" typeface="Sylfaen"/>
+        <a:font script="Armn" typeface="Arial"/>
+        <a:font script="Bugi" typeface="Leelawadee UI"/>
+        <a:font script="Bopo" typeface="Microsoft JhengHei"/>
+        <a:font script="Java" typeface="Javanese Text"/>
+        <a:font script="Lisu" typeface="Segoe UI"/>
+        <a:font script="Mymr" typeface="Myanmar Text"/>
+        <a:font script="Nkoo" typeface="Ebrima"/>
+        <a:font script="Olck" typeface="Nirmala UI"/>
+        <a:font script="Osma" typeface="Ebrima"/>
+        <a:font script="Phag" typeface="Phagspa"/>
+        <a:font script="Syrn" typeface="Estrangelo Edessa"/>
+        <a:font script="Syrj" typeface="Estrangelo Edessa"/>
+        <a:font script="Syre" typeface="Estrangelo Edessa"/>
+        <a:font script="Sora" typeface="Nirmala UI"/>
+        <a:font script="Tale" typeface="Microsoft Tai Le"/>
+        <a:font script="Talu" typeface="Microsoft New Tai Lue"/>
+        <a:font script="Tfng" typeface="Ebrima"/>
+      </a:minorFont>
+    </a:fontScheme>
+    <a:fmtScheme name="Office">
+      <a:fillStyleLst>
+        <a:solidFill>
+          <a:schemeClr val="phClr"/>
+        </a:solidFill>
+        <a:gradFill rotWithShape="1">
+          <a:gsLst>
+            <a:gs pos="0">
+              <a:schemeClr val="phClr">
+                <a:lumMod val="110000"/>
+                <a:satMod val="105000"/>
+                <a:tint val="67000"/>
+              </a:schemeClr>
+            </a:gs>
+            <a:gs pos="50000">
+              <a:schemeClr val="phClr">
+                <a:lumMod val="105000"/>
+                <a:satMod val="103000"/>
+                <a:tint val="73000"/>
+              </a:schemeClr>
+            </a:gs>
+            <a:gs pos="100000">
+              <a:schemeClr val="phClr">
+                <a:lumMod val="105000"/>
+                <a:satMod val="109000"/>
+                <a:tint val="81000"/>
+              </a:schemeClr>
+            </a:gs>
+          </a:gsLst>
+          <a:lin ang="5400000" scaled="0"/>
+        </a:gradFill>
+        <a:gradFill rotWithShape="1">
+          <a:gsLst>
+            <a:gs pos="0">
+              <a:schemeClr val="phClr">
+                <a:satMod val="103000"/>
+                <a:lumMod val="102000"/>
+                <a:tint val="94000"/>
+              </a:schemeClr>
+            </a:gs>
+            <a:gs pos="50000">
+              <a:schemeClr val="phClr">
+                <a:satMod val="110000"/>
+                <a:lumMod val="100000"/>
+                <a:shade val="100000"/>
+              </a:schemeClr>
+            </a:gs>
+            <a:gs pos="100000">
+              <a:schemeClr val="phClr">
+                <a:lumMod val="99000"/>
+                <a:satMod val="120000"/>
+                <a:shade val="78000"/>
+              </a:schemeClr>
+            </a:gs>
+          </a:gsLst>
+          <a:lin ang="5400000" scaled="0"/>
+        </a:gradFill>
+      </a:fillStyleLst>
+      <a:lnStyleLst>
+        <a:ln w="6350" cap="flat" cmpd="sng" algn="ctr">
+          <a:solidFill>
+            <a:schemeClr val="phClr"/>
+          </a:solidFill>
+          <a:prstDash val="solid"/>
+          <a:miter lim="800000"/>
+        </a:ln>
+        <a:ln w="12700" cap="flat" cmpd="sng" algn="ctr">
+          <a:solidFill>
+            <a:schemeClr val="phClr"/>
+          </a:solidFill>
+          <a:prstDash val="solid"/>
+          <a:miter lim="800000"/>
+        </a:ln>
+        <a:ln w="19050" cap="flat" cmpd="sng" algn="ctr">
+          <a:solidFill>
+            <a:schemeClr val="phClr"/>
+          </a:solidFill>
+          <a:prstDash val="solid"/>
+          <a:miter lim="800000"/>
+        </a:ln>
+      </a:lnStyleLst>
+      <a:effectStyleLst>
+        <a:effectStyle>
+          <a:effectLst/>
+        </a:effectStyle>
+        <a:effectStyle>
+          <a:effectLst/>
+        </a:effectStyle>
+        <a:effectStyle>
+          <a:effectLst>
+            <a:outerShdw blurRad="57150" dist="19050" dir="5400000" algn="ctr" rotWithShape="0">
+              <a:srgbClr val="000000">
+                <a:alpha val="63000"/>
+              </a:srgbClr>
+            </a:outerShdw>
+          </a:effectLst>
+        </a:effectStyle>
+      </a:effectStyleLst>
+      <a:bgFillStyleLst>
+        <a:solidFill>
+          <a:schemeClr val="phClr"/>
+        </a:solidFill>
+        <a:solidFill>
+          <a:schemeClr val="phClr">
+            <a:tint val="95000"/>
+            <a:satMod val="170000"/>
+          </a:schemeClr>
+        </a:solidFill>
+        <a:gradFill rotWithShape="1">
+          <a:gsLst>
+            <a:gs pos="0">
+              <a:schemeClr val="phClr">
+                <a:tint val="93000"/>
+                <a:satMod val="150000"/>
+                <a:shade val="98000"/>
+                <a:lumMod val="102000"/>
+              </a:schemeClr>
+            </a:gs>
+            <a:gs pos="50000">
+              <a:schemeClr val="phClr">
+                <a:tint val="98000"/>
+                <a:satMod val="130000"/>
+                <a:shade val="90000"/>
+                <a:lumMod val="103000"/>
+              </a:schemeClr>
+            </a:gs>
+            <a:gs pos="100000">
+              <a:schemeClr val="phClr">
+                <a:shade val="63000"/>
+                <a:satMod val="120000"/>
+              </a:schemeClr>
+            </a:gs>
+          </a:gsLst>
+          <a:lin ang="5400000" scaled="0"/>
+        </a:gradFill>
+      </a:bgFillStyleLst>
+    </a:fmtScheme>
+  </a:themeElements>
+  <a:objectDefaults/>
+  <a:extraClrSchemeLst/>
+  <a:extLst>
+    <a:ext uri="{05A4C25C-085E-4340-85A3-A5531E510DB2}">
+      <thm15:themeFamily xmlns:thm15="http://schemas.microsoft.com/office/thememl/2012/main" name="Office Theme" id="{62F939B6-93AF-4DB8-9C6B-D6C7DFDC589F}" vid="{4A3C46E8-61CC-4603-A589-7422A47A8E4A}"/>
+    </a:ext>
+  </a:extLst>
+</a:theme>
 </file>
</xml_diff>

<commit_message>
Update to slide format
</commit_message>
<xml_diff>
--- a/Design Goals pptx/Write-Log design goals.pptx
+++ b/Design Goals pptx/Write-Log design goals.pptx
@@ -202,7 +202,7 @@
           <a:p>
             <a:fld id="{102F7FC1-B21E-4D70-B766-E775F57CFF14}" type="datetimeFigureOut">
               <a:rPr lang="en-GB" smtClean="0"/>
-              <a:t>06/02/2018</a:t>
+              <a:t>07/02/2018</a:t>
             </a:fld>
             <a:endParaRPr lang="en-GB"/>
           </a:p>
@@ -656,7 +656,7 @@
           <a:p>
             <a:fld id="{FFB01E18-4CCF-485A-973C-3368A927D644}" type="datetime1">
               <a:rPr lang="en-GB" smtClean="0"/>
-              <a:t>06/02/2018</a:t>
+              <a:t>07/02/2018</a:t>
             </a:fld>
             <a:endParaRPr lang="en-GB"/>
           </a:p>
@@ -934,7 +934,7 @@
           <a:p>
             <a:fld id="{6B136DAE-6D16-469C-A893-707F05402944}" type="datetime1">
               <a:rPr lang="en-GB" smtClean="0"/>
-              <a:t>06/02/2018</a:t>
+              <a:t>07/02/2018</a:t>
             </a:fld>
             <a:endParaRPr lang="en-GB"/>
           </a:p>
@@ -1131,7 +1131,7 @@
           <a:p>
             <a:fld id="{88393952-4671-4469-960B-61357D269570}" type="datetime1">
               <a:rPr lang="en-GB" smtClean="0"/>
-              <a:t>06/02/2018</a:t>
+              <a:t>07/02/2018</a:t>
             </a:fld>
             <a:endParaRPr lang="en-GB"/>
           </a:p>
@@ -1407,7 +1407,7 @@
           <a:p>
             <a:fld id="{DE198B09-3539-4140-BC4F-85691395AE64}" type="datetime1">
               <a:rPr lang="en-GB" smtClean="0"/>
-              <a:t>06/02/2018</a:t>
+              <a:t>07/02/2018</a:t>
             </a:fld>
             <a:endParaRPr lang="en-GB"/>
           </a:p>
@@ -1751,7 +1751,7 @@
           <a:p>
             <a:fld id="{4B50215B-8CF9-4B59-95C9-A1D81365ED74}" type="datetime1">
               <a:rPr lang="en-GB" smtClean="0"/>
-              <a:t>06/02/2018</a:t>
+              <a:t>07/02/2018</a:t>
             </a:fld>
             <a:endParaRPr lang="en-GB"/>
           </a:p>
@@ -2377,7 +2377,7 @@
           <a:p>
             <a:fld id="{86676B25-2AE1-46DF-95B1-9541FED5CB40}" type="datetime1">
               <a:rPr lang="en-GB" smtClean="0"/>
-              <a:t>06/02/2018</a:t>
+              <a:t>07/02/2018</a:t>
             </a:fld>
             <a:endParaRPr lang="en-GB"/>
           </a:p>
@@ -3240,7 +3240,7 @@
           <a:p>
             <a:fld id="{C64BDC7E-23B0-4D74-952F-1B0A487A6440}" type="datetime1">
               <a:rPr lang="en-GB" smtClean="0"/>
-              <a:t>06/02/2018</a:t>
+              <a:t>07/02/2018</a:t>
             </a:fld>
             <a:endParaRPr lang="en-GB"/>
           </a:p>
@@ -3413,7 +3413,7 @@
           <a:p>
             <a:fld id="{A7440DDA-6E3F-4D76-B9CE-2B8C251B5372}" type="datetime1">
               <a:rPr lang="en-GB" smtClean="0"/>
-              <a:t>06/02/2018</a:t>
+              <a:t>07/02/2018</a:t>
             </a:fld>
             <a:endParaRPr lang="en-GB"/>
           </a:p>
@@ -3596,7 +3596,7 @@
           <a:p>
             <a:fld id="{6CF90DDC-9D4A-4C2F-8E02-A98B324260DA}" type="datetime1">
               <a:rPr lang="en-GB" smtClean="0"/>
-              <a:t>06/02/2018</a:t>
+              <a:t>07/02/2018</a:t>
             </a:fld>
             <a:endParaRPr lang="en-GB"/>
           </a:p>
@@ -3769,7 +3769,7 @@
           <a:p>
             <a:fld id="{FFA8A3FE-D1BD-4574-85D8-D514F4BA8422}" type="datetime1">
               <a:rPr lang="en-GB" smtClean="0"/>
-              <a:t>06/02/2018</a:t>
+              <a:t>07/02/2018</a:t>
             </a:fld>
             <a:endParaRPr lang="en-GB"/>
           </a:p>
@@ -4019,7 +4019,7 @@
           <a:p>
             <a:fld id="{8F4B27B8-AF3B-43A2-BB32-CF519CE75837}" type="datetime1">
               <a:rPr lang="en-GB" smtClean="0"/>
-              <a:t>06/02/2018</a:t>
+              <a:t>07/02/2018</a:t>
             </a:fld>
             <a:endParaRPr lang="en-GB"/>
           </a:p>
@@ -4314,7 +4314,7 @@
           <a:p>
             <a:fld id="{66F316C1-B30C-4BC6-89C9-B80B5CDB7374}" type="datetime1">
               <a:rPr lang="en-GB" smtClean="0"/>
-              <a:t>06/02/2018</a:t>
+              <a:t>07/02/2018</a:t>
             </a:fld>
             <a:endParaRPr lang="en-GB"/>
           </a:p>
@@ -4761,7 +4761,7 @@
           <a:p>
             <a:fld id="{813D90DC-5067-46D1-8A4E-C4259DAB6354}" type="datetime1">
               <a:rPr lang="en-GB" smtClean="0"/>
-              <a:t>06/02/2018</a:t>
+              <a:t>07/02/2018</a:t>
             </a:fld>
             <a:endParaRPr lang="en-GB"/>
           </a:p>
@@ -4882,7 +4882,7 @@
           <a:p>
             <a:fld id="{50B3F8FC-087D-4D20-BD2E-4C6FC66633DC}" type="datetime1">
               <a:rPr lang="en-GB" smtClean="0"/>
-              <a:t>06/02/2018</a:t>
+              <a:t>07/02/2018</a:t>
             </a:fld>
             <a:endParaRPr lang="en-GB"/>
           </a:p>
@@ -4980,7 +4980,7 @@
           <a:p>
             <a:fld id="{289F9F86-0B0B-4593-B854-8F0B6D47FBE7}" type="datetime1">
               <a:rPr lang="en-GB" smtClean="0"/>
-              <a:t>06/02/2018</a:t>
+              <a:t>07/02/2018</a:t>
             </a:fld>
             <a:endParaRPr lang="en-GB"/>
           </a:p>
@@ -5262,7 +5262,7 @@
           <a:p>
             <a:fld id="{EDDD97C9-BB1F-4383-A2FB-16C3FFE1D6D3}" type="datetime1">
               <a:rPr lang="en-GB" smtClean="0"/>
-              <a:t>06/02/2018</a:t>
+              <a:t>07/02/2018</a:t>
             </a:fld>
             <a:endParaRPr lang="en-GB"/>
           </a:p>
@@ -5540,7 +5540,7 @@
           <a:p>
             <a:fld id="{D6C2AA35-846A-40E4-830D-15CF4BD67F5E}" type="datetime1">
               <a:rPr lang="en-GB" smtClean="0"/>
-              <a:t>06/02/2018</a:t>
+              <a:t>07/02/2018</a:t>
             </a:fld>
             <a:endParaRPr lang="en-GB"/>
           </a:p>
@@ -5972,7 +5972,7 @@
           <a:p>
             <a:fld id="{E9C9FC63-C035-45F8-BAC6-BBAE95C793D2}" type="datetime1">
               <a:rPr lang="en-GB" smtClean="0"/>
-              <a:t>06/02/2018</a:t>
+              <a:t>07/02/2018</a:t>
             </a:fld>
             <a:endParaRPr lang="en-GB"/>
           </a:p>
@@ -6527,7 +6527,7 @@
           <a:p>
             <a:r>
               <a:rPr lang="en-GB" sz="4000" dirty="0"/>
-              <a:t>Worked Example of a public function</a:t>
+              <a:t>Worked example of a public function</a:t>
             </a:r>
           </a:p>
         </p:txBody>

</xml_diff>